<commit_message>
Slight update to visuals for Tableau ppt.
</commit_message>
<xml_diff>
--- a/resources/tableau_overview_and_example_ss_hz_updated.pptx
+++ b/resources/tableau_overview_and_example_ss_hz_updated.pptx
@@ -217,7 +217,7 @@
           <a:p>
             <a:fld id="{023AB371-9479-4211-AEA2-B8B235DBD730}" type="datetimeFigureOut">
               <a:rPr lang="en-US" smtClean="0"/>
-              <a:t>1/30/2023</a:t>
+              <a:t>2/2/2023</a:t>
             </a:fld>
             <a:endParaRPr lang="en-US"/>
           </a:p>
@@ -382,7 +382,7 @@
           <a:p>
             <a:fld id="{3BE0F1DC-89DC-4407-B031-C64D21A63C8E}" type="datetimeFigureOut">
               <a:rPr lang="en-US" smtClean="0"/>
-              <a:t>1/30/2023</a:t>
+              <a:t>2/2/2023</a:t>
             </a:fld>
             <a:endParaRPr lang="en-US"/>
           </a:p>
@@ -862,7 +862,7 @@
           <a:p>
             <a:fld id="{EAC6DD1A-DB46-4DE9-B199-B2FE535F0796}" type="datetime1">
               <a:rPr lang="en-US" smtClean="0"/>
-              <a:t>1/30/2023</a:t>
+              <a:t>2/2/2023</a:t>
             </a:fld>
             <a:endParaRPr lang="en-US"/>
           </a:p>
@@ -1030,7 +1030,7 @@
           <a:p>
             <a:fld id="{790617B3-9292-4403-AC8C-CE70F1933C12}" type="datetime1">
               <a:rPr lang="en-US" smtClean="0"/>
-              <a:t>1/30/2023</a:t>
+              <a:t>2/2/2023</a:t>
             </a:fld>
             <a:endParaRPr lang="en-US"/>
           </a:p>
@@ -1208,7 +1208,7 @@
           <a:p>
             <a:fld id="{96C89685-F276-430A-8654-04914813DB04}" type="datetime1">
               <a:rPr lang="en-US" smtClean="0"/>
-              <a:t>1/30/2023</a:t>
+              <a:t>2/2/2023</a:t>
             </a:fld>
             <a:endParaRPr lang="en-US"/>
           </a:p>
@@ -1380,7 +1380,7 @@
           <a:p>
             <a:fld id="{7428BE0C-F798-44C1-BF61-615514117515}" type="datetime1">
               <a:rPr lang="en-US" smtClean="0"/>
-              <a:t>1/30/2023</a:t>
+              <a:t>2/2/2023</a:t>
             </a:fld>
             <a:endParaRPr lang="en-US"/>
           </a:p>
@@ -1625,7 +1625,7 @@
           <a:p>
             <a:fld id="{638D9F68-CEAC-4C1F-A1F1-3BCAF2B06B58}" type="datetime1">
               <a:rPr lang="en-US" smtClean="0"/>
-              <a:t>1/30/2023</a:t>
+              <a:t>2/2/2023</a:t>
             </a:fld>
             <a:endParaRPr lang="en-US"/>
           </a:p>
@@ -1854,7 +1854,7 @@
           <a:p>
             <a:fld id="{A346C6D6-79EA-4D53-8AE7-5F6F5F736EB9}" type="datetime1">
               <a:rPr lang="en-US" smtClean="0"/>
-              <a:t>1/30/2023</a:t>
+              <a:t>2/2/2023</a:t>
             </a:fld>
             <a:endParaRPr lang="en-US"/>
           </a:p>
@@ -2218,7 +2218,7 @@
           <a:p>
             <a:fld id="{6E092D23-7948-4023-A9B1-EC40528BF935}" type="datetime1">
               <a:rPr lang="en-US" smtClean="0"/>
-              <a:t>1/30/2023</a:t>
+              <a:t>2/2/2023</a:t>
             </a:fld>
             <a:endParaRPr lang="en-US"/>
           </a:p>
@@ -2335,7 +2335,7 @@
           <a:p>
             <a:fld id="{CB7F9289-E90C-40AA-9479-E06605E009D1}" type="datetime1">
               <a:rPr lang="en-US" smtClean="0"/>
-              <a:t>1/30/2023</a:t>
+              <a:t>2/2/2023</a:t>
             </a:fld>
             <a:endParaRPr lang="en-US"/>
           </a:p>
@@ -2430,7 +2430,7 @@
           <a:p>
             <a:fld id="{77B87E22-A063-4A64-AA63-4C57F03AF091}" type="datetime1">
               <a:rPr lang="en-US" smtClean="0"/>
-              <a:t>1/30/2023</a:t>
+              <a:t>2/2/2023</a:t>
             </a:fld>
             <a:endParaRPr lang="en-US"/>
           </a:p>
@@ -2705,7 +2705,7 @@
           <a:p>
             <a:fld id="{AC696D8C-2084-406E-8355-4B70646298D8}" type="datetime1">
               <a:rPr lang="en-US" smtClean="0"/>
-              <a:t>1/30/2023</a:t>
+              <a:t>2/2/2023</a:t>
             </a:fld>
             <a:endParaRPr lang="en-US"/>
           </a:p>
@@ -2957,7 +2957,7 @@
           <a:p>
             <a:fld id="{FD6E1C9B-9226-4DE6-8A54-EC9D97CE7113}" type="datetime1">
               <a:rPr lang="en-US" smtClean="0"/>
-              <a:t>1/30/2023</a:t>
+              <a:t>2/2/2023</a:t>
             </a:fld>
             <a:endParaRPr lang="en-US"/>
           </a:p>
@@ -3168,7 +3168,7 @@
           <a:p>
             <a:fld id="{A124E9DD-72DA-4B57-B242-DDD62FE3B182}" type="datetime1">
               <a:rPr lang="en-US" smtClean="0"/>
-              <a:t>1/30/2023</a:t>
+              <a:t>2/2/2023</a:t>
             </a:fld>
             <a:endParaRPr lang="en-US"/>
           </a:p>
@@ -10049,6 +10049,66 @@
           <a:chExt cx="0" cy="0"/>
         </a:xfrm>
       </p:grpSpPr>
+      <p:pic>
+        <p:nvPicPr>
+          <p:cNvPr id="20" name="Picture 19">
+            <a:extLst>
+              <a:ext uri="{FF2B5EF4-FFF2-40B4-BE49-F238E27FC236}">
+                <a16:creationId xmlns:a16="http://schemas.microsoft.com/office/drawing/2014/main" id="{93046477-2E35-44F2-F7BC-18554247821F}"/>
+              </a:ext>
+            </a:extLst>
+          </p:cNvPr>
+          <p:cNvPicPr>
+            <a:picLocks noChangeAspect="1"/>
+          </p:cNvPicPr>
+          <p:nvPr/>
+        </p:nvPicPr>
+        <p:blipFill>
+          <a:blip r:embed="rId2"/>
+          <a:stretch>
+            <a:fillRect/>
+          </a:stretch>
+        </p:blipFill>
+        <p:spPr>
+          <a:xfrm>
+            <a:off x="6271187" y="1354179"/>
+            <a:ext cx="5258256" cy="1028789"/>
+          </a:xfrm>
+          <a:prstGeom prst="rect">
+            <a:avLst/>
+          </a:prstGeom>
+        </p:spPr>
+      </p:pic>
+      <p:pic>
+        <p:nvPicPr>
+          <p:cNvPr id="23" name="Picture 22">
+            <a:extLst>
+              <a:ext uri="{FF2B5EF4-FFF2-40B4-BE49-F238E27FC236}">
+                <a16:creationId xmlns:a16="http://schemas.microsoft.com/office/drawing/2014/main" id="{352334DD-92BD-6DBA-DB44-765AF304312C}"/>
+              </a:ext>
+            </a:extLst>
+          </p:cNvPr>
+          <p:cNvPicPr>
+            <a:picLocks noChangeAspect="1"/>
+          </p:cNvPicPr>
+          <p:nvPr/>
+        </p:nvPicPr>
+        <p:blipFill>
+          <a:blip r:embed="rId3"/>
+          <a:stretch>
+            <a:fillRect/>
+          </a:stretch>
+        </p:blipFill>
+        <p:spPr>
+          <a:xfrm>
+            <a:off x="7135144" y="2134623"/>
+            <a:ext cx="3977985" cy="1486029"/>
+          </a:xfrm>
+          <a:prstGeom prst="rect">
+            <a:avLst/>
+          </a:prstGeom>
+        </p:spPr>
+      </p:pic>
       <p:sp>
         <p:nvSpPr>
           <p:cNvPr id="2" name="Title 1"/>
@@ -10167,7 +10227,7 @@
           <p:nvPr/>
         </p:nvPicPr>
         <p:blipFill>
-          <a:blip r:embed="rId2"/>
+          <a:blip r:embed="rId4"/>
           <a:stretch>
             <a:fillRect/>
           </a:stretch>
@@ -10237,7 +10297,7 @@
           <p:nvPr/>
         </p:nvPicPr>
         <p:blipFill>
-          <a:blip r:embed="rId3"/>
+          <a:blip r:embed="rId5"/>
           <a:stretch>
             <a:fillRect/>
           </a:stretch>
@@ -10246,30 +10306,6 @@
           <a:xfrm>
             <a:off x="3200400" y="1006391"/>
             <a:ext cx="2628900" cy="3009900"/>
-          </a:xfrm>
-          <a:prstGeom prst="rect">
-            <a:avLst/>
-          </a:prstGeom>
-        </p:spPr>
-      </p:pic>
-      <p:pic>
-        <p:nvPicPr>
-          <p:cNvPr id="8" name="Picture 7"/>
-          <p:cNvPicPr>
-            <a:picLocks noChangeAspect="1"/>
-          </p:cNvPicPr>
-          <p:nvPr/>
-        </p:nvPicPr>
-        <p:blipFill>
-          <a:blip r:embed="rId4"/>
-          <a:stretch>
-            <a:fillRect/>
-          </a:stretch>
-        </p:blipFill>
-        <p:spPr>
-          <a:xfrm>
-            <a:off x="6662737" y="1227138"/>
-            <a:ext cx="5057775" cy="2190750"/>
           </a:xfrm>
           <a:prstGeom prst="rect">
             <a:avLst/>
@@ -10376,8 +10412,8 @@
         </p:nvSpPr>
         <p:spPr>
           <a:xfrm>
-            <a:off x="7342026" y="2610301"/>
-            <a:ext cx="792324" cy="199574"/>
+            <a:off x="7282747" y="2893347"/>
+            <a:ext cx="1078302" cy="219246"/>
           </a:xfrm>
           <a:prstGeom prst="rect">
             <a:avLst/>
@@ -10422,7 +10458,7 @@
         </p:nvSpPr>
         <p:spPr>
           <a:xfrm>
-            <a:off x="9361326" y="2610301"/>
+            <a:off x="9476198" y="2907095"/>
             <a:ext cx="792324" cy="199574"/>
           </a:xfrm>
           <a:prstGeom prst="rect">
@@ -10468,8 +10504,8 @@
         </p:nvSpPr>
         <p:spPr>
           <a:xfrm>
-            <a:off x="7332501" y="1800676"/>
-            <a:ext cx="925674" cy="630238"/>
+            <a:off x="6340577" y="1580788"/>
+            <a:ext cx="5186422" cy="543984"/>
           </a:xfrm>
           <a:prstGeom prst="rect">
             <a:avLst/>
@@ -10580,7 +10616,7 @@
         </p:nvSpPr>
         <p:spPr>
           <a:xfrm>
-            <a:off x="7024357" y="1944949"/>
+            <a:off x="6687271" y="2095084"/>
             <a:ext cx="322917" cy="369332"/>
           </a:xfrm>
           <a:prstGeom prst="rect">
@@ -10613,7 +10649,7 @@
         </p:nvSpPr>
         <p:spPr>
           <a:xfrm>
-            <a:off x="8738857" y="2935549"/>
+            <a:off x="8772329" y="3382087"/>
             <a:ext cx="322917" cy="369332"/>
           </a:xfrm>
           <a:prstGeom prst="rect">
@@ -10642,14 +10678,16 @@
         <p:nvCxnSpPr>
           <p:cNvPr id="19" name="Straight Arrow Connector 18"/>
           <p:cNvCxnSpPr>
+            <a:cxnSpLocks/>
             <a:stCxn id="17" idx="0"/>
+            <a:endCxn id="11" idx="2"/>
           </p:cNvCxnSpPr>
           <p:nvPr/>
         </p:nvCxnSpPr>
         <p:spPr>
           <a:xfrm flipH="1" flipV="1">
-            <a:off x="7759700" y="2809875"/>
-            <a:ext cx="1140616" cy="125674"/>
+            <a:off x="7821898" y="3112593"/>
+            <a:ext cx="1111890" cy="269494"/>
           </a:xfrm>
           <a:prstGeom prst="straightConnector1">
             <a:avLst/>
@@ -10687,8 +10725,8 @@
         </p:nvCxnSpPr>
         <p:spPr>
           <a:xfrm flipV="1">
-            <a:off x="8900316" y="2809875"/>
-            <a:ext cx="857172" cy="125674"/>
+            <a:off x="8933788" y="3106669"/>
+            <a:ext cx="938572" cy="275418"/>
           </a:xfrm>
           <a:prstGeom prst="straightConnector1">
             <a:avLst/>

</xml_diff>